<commit_message>
Input file button replaced by label button
</commit_message>
<xml_diff>
--- a/Description/JazzGuestsAdmin.pptx
+++ b/Description/JazzGuestsAdmin.pptx
@@ -258,7 +258,7 @@
           <a:p>
             <a:fld id="{DDCE6D58-9B57-4731-A47B-3CD41B48F0A9}" type="datetimeFigureOut">
               <a:rPr lang="de-CH" smtClean="0"/>
-              <a:t>12.12.2023</a:t>
+              <a:t>21.12.2023</a:t>
             </a:fld>
             <a:endParaRPr lang="de-CH"/>
           </a:p>
@@ -428,7 +428,7 @@
           <a:p>
             <a:fld id="{DDCE6D58-9B57-4731-A47B-3CD41B48F0A9}" type="datetimeFigureOut">
               <a:rPr lang="de-CH" smtClean="0"/>
-              <a:t>12.12.2023</a:t>
+              <a:t>21.12.2023</a:t>
             </a:fld>
             <a:endParaRPr lang="de-CH"/>
           </a:p>
@@ -608,7 +608,7 @@
           <a:p>
             <a:fld id="{DDCE6D58-9B57-4731-A47B-3CD41B48F0A9}" type="datetimeFigureOut">
               <a:rPr lang="de-CH" smtClean="0"/>
-              <a:t>12.12.2023</a:t>
+              <a:t>21.12.2023</a:t>
             </a:fld>
             <a:endParaRPr lang="de-CH"/>
           </a:p>
@@ -778,7 +778,7 @@
           <a:p>
             <a:fld id="{DDCE6D58-9B57-4731-A47B-3CD41B48F0A9}" type="datetimeFigureOut">
               <a:rPr lang="de-CH" smtClean="0"/>
-              <a:t>12.12.2023</a:t>
+              <a:t>21.12.2023</a:t>
             </a:fld>
             <a:endParaRPr lang="de-CH"/>
           </a:p>
@@ -1024,7 +1024,7 @@
           <a:p>
             <a:fld id="{DDCE6D58-9B57-4731-A47B-3CD41B48F0A9}" type="datetimeFigureOut">
               <a:rPr lang="de-CH" smtClean="0"/>
-              <a:t>12.12.2023</a:t>
+              <a:t>21.12.2023</a:t>
             </a:fld>
             <a:endParaRPr lang="de-CH"/>
           </a:p>
@@ -1256,7 +1256,7 @@
           <a:p>
             <a:fld id="{DDCE6D58-9B57-4731-A47B-3CD41B48F0A9}" type="datetimeFigureOut">
               <a:rPr lang="de-CH" smtClean="0"/>
-              <a:t>12.12.2023</a:t>
+              <a:t>21.12.2023</a:t>
             </a:fld>
             <a:endParaRPr lang="de-CH"/>
           </a:p>
@@ -1623,7 +1623,7 @@
           <a:p>
             <a:fld id="{DDCE6D58-9B57-4731-A47B-3CD41B48F0A9}" type="datetimeFigureOut">
               <a:rPr lang="de-CH" smtClean="0"/>
-              <a:t>12.12.2023</a:t>
+              <a:t>21.12.2023</a:t>
             </a:fld>
             <a:endParaRPr lang="de-CH"/>
           </a:p>
@@ -1741,7 +1741,7 @@
           <a:p>
             <a:fld id="{DDCE6D58-9B57-4731-A47B-3CD41B48F0A9}" type="datetimeFigureOut">
               <a:rPr lang="de-CH" smtClean="0"/>
-              <a:t>12.12.2023</a:t>
+              <a:t>21.12.2023</a:t>
             </a:fld>
             <a:endParaRPr lang="de-CH"/>
           </a:p>
@@ -1836,7 +1836,7 @@
           <a:p>
             <a:fld id="{DDCE6D58-9B57-4731-A47B-3CD41B48F0A9}" type="datetimeFigureOut">
               <a:rPr lang="de-CH" smtClean="0"/>
-              <a:t>12.12.2023</a:t>
+              <a:t>21.12.2023</a:t>
             </a:fld>
             <a:endParaRPr lang="de-CH"/>
           </a:p>
@@ -2113,7 +2113,7 @@
           <a:p>
             <a:fld id="{DDCE6D58-9B57-4731-A47B-3CD41B48F0A9}" type="datetimeFigureOut">
               <a:rPr lang="de-CH" smtClean="0"/>
-              <a:t>12.12.2023</a:t>
+              <a:t>21.12.2023</a:t>
             </a:fld>
             <a:endParaRPr lang="de-CH"/>
           </a:p>
@@ -2366,7 +2366,7 @@
           <a:p>
             <a:fld id="{DDCE6D58-9B57-4731-A47B-3CD41B48F0A9}" type="datetimeFigureOut">
               <a:rPr lang="de-CH" smtClean="0"/>
-              <a:t>12.12.2023</a:t>
+              <a:t>21.12.2023</a:t>
             </a:fld>
             <a:endParaRPr lang="de-CH"/>
           </a:p>
@@ -2579,7 +2579,7 @@
           <a:p>
             <a:fld id="{DDCE6D58-9B57-4731-A47B-3CD41B48F0A9}" type="datetimeFigureOut">
               <a:rPr lang="de-CH" smtClean="0"/>
-              <a:t>12.12.2023</a:t>
+              <a:t>21.12.2023</a:t>
             </a:fld>
             <a:endParaRPr lang="de-CH"/>
           </a:p>
@@ -7760,7 +7760,7 @@
         </p:nvSpPr>
         <p:spPr>
           <a:xfrm>
-            <a:off x="821444" y="2068646"/>
+            <a:off x="821444" y="1446475"/>
             <a:ext cx="5059776" cy="2834491"/>
           </a:xfrm>
           <a:prstGeom prst="rect">
@@ -7812,7 +7812,7 @@
         </p:nvSpPr>
         <p:spPr>
           <a:xfrm>
-            <a:off x="821443" y="2132279"/>
+            <a:off x="821443" y="1510108"/>
             <a:ext cx="4721518" cy="261610"/>
           </a:xfrm>
           <a:prstGeom prst="rect">
@@ -7872,7 +7872,7 @@
         </p:nvSpPr>
         <p:spPr>
           <a:xfrm>
-            <a:off x="6282904" y="2068646"/>
+            <a:off x="6282904" y="1446475"/>
             <a:ext cx="5059776" cy="2834491"/>
           </a:xfrm>
           <a:prstGeom prst="rect">
@@ -7924,7 +7924,7 @@
         </p:nvSpPr>
         <p:spPr>
           <a:xfrm>
-            <a:off x="6407594" y="2116848"/>
+            <a:off x="6407594" y="1494677"/>
             <a:ext cx="4544953" cy="261610"/>
           </a:xfrm>
           <a:prstGeom prst="rect">
@@ -7988,7 +7988,7 @@
         </p:nvSpPr>
         <p:spPr>
           <a:xfrm>
-            <a:off x="880868" y="2457522"/>
+            <a:off x="880868" y="1835351"/>
             <a:ext cx="4875661" cy="289123"/>
           </a:xfrm>
           <a:prstGeom prst="rect">
@@ -8040,7 +8040,7 @@
         </p:nvSpPr>
         <p:spPr>
           <a:xfrm>
-            <a:off x="880868" y="2451094"/>
+            <a:off x="880868" y="1828923"/>
             <a:ext cx="4568090" cy="261610"/>
           </a:xfrm>
           <a:prstGeom prst="rect">
@@ -8100,7 +8100,7 @@
         </p:nvSpPr>
         <p:spPr>
           <a:xfrm>
-            <a:off x="880868" y="2831595"/>
+            <a:off x="880868" y="2209424"/>
             <a:ext cx="4875661" cy="1971790"/>
           </a:xfrm>
           <a:prstGeom prst="rect">
@@ -8152,7 +8152,7 @@
         </p:nvSpPr>
         <p:spPr>
           <a:xfrm>
-            <a:off x="880868" y="2825167"/>
+            <a:off x="880868" y="2202996"/>
             <a:ext cx="5000352" cy="261610"/>
           </a:xfrm>
           <a:prstGeom prst="rect">
@@ -8212,7 +8212,7 @@
         </p:nvSpPr>
         <p:spPr>
           <a:xfrm>
-            <a:off x="6407594" y="2759932"/>
+            <a:off x="6407594" y="2137761"/>
             <a:ext cx="4875661" cy="653689"/>
           </a:xfrm>
           <a:prstGeom prst="rect">
@@ -8264,7 +8264,7 @@
         </p:nvSpPr>
         <p:spPr>
           <a:xfrm>
-            <a:off x="6407594" y="2753504"/>
+            <a:off x="6407594" y="2131333"/>
             <a:ext cx="4568090" cy="261610"/>
           </a:xfrm>
           <a:prstGeom prst="rect">
@@ -8308,7 +8308,7 @@
         </p:nvSpPr>
         <p:spPr>
           <a:xfrm>
-            <a:off x="6491958" y="3032388"/>
+            <a:off x="6491958" y="2410217"/>
             <a:ext cx="2298715" cy="289123"/>
           </a:xfrm>
           <a:prstGeom prst="rect">
@@ -8360,7 +8360,7 @@
         </p:nvSpPr>
         <p:spPr>
           <a:xfrm>
-            <a:off x="6491957" y="3032619"/>
+            <a:off x="6491957" y="2410448"/>
             <a:ext cx="2041021" cy="261610"/>
           </a:xfrm>
           <a:prstGeom prst="rect">
@@ -8400,7 +8400,7 @@
         </p:nvSpPr>
         <p:spPr>
           <a:xfrm>
-            <a:off x="8880480" y="3026848"/>
+            <a:off x="8880480" y="2404677"/>
             <a:ext cx="2298715" cy="289123"/>
           </a:xfrm>
           <a:prstGeom prst="rect">
@@ -8452,7 +8452,7 @@
         </p:nvSpPr>
         <p:spPr>
           <a:xfrm>
-            <a:off x="8880479" y="3020419"/>
+            <a:off x="8880479" y="2398248"/>
             <a:ext cx="2383080" cy="261610"/>
           </a:xfrm>
           <a:prstGeom prst="rect">
@@ -8588,7 +8588,7 @@
         </p:nvSpPr>
         <p:spPr>
           <a:xfrm>
-            <a:off x="6396211" y="3474700"/>
+            <a:off x="6415907" y="1769132"/>
             <a:ext cx="4875661" cy="289123"/>
           </a:xfrm>
           <a:prstGeom prst="rect">
@@ -8640,7 +8640,7 @@
         </p:nvSpPr>
         <p:spPr>
           <a:xfrm>
-            <a:off x="6387898" y="3468272"/>
+            <a:off x="6407594" y="1762704"/>
             <a:ext cx="4568090" cy="261610"/>
           </a:xfrm>
           <a:prstGeom prst="rect">
@@ -8684,7 +8684,7 @@
         </p:nvSpPr>
         <p:spPr>
           <a:xfrm>
-            <a:off x="6415907" y="3815784"/>
+            <a:off x="793052" y="5050075"/>
             <a:ext cx="4875661" cy="289123"/>
           </a:xfrm>
           <a:prstGeom prst="rect">
@@ -8736,7 +8736,7 @@
         </p:nvSpPr>
         <p:spPr>
           <a:xfrm>
-            <a:off x="6407594" y="3809356"/>
+            <a:off x="784739" y="5043647"/>
             <a:ext cx="4568090" cy="261610"/>
           </a:xfrm>
           <a:prstGeom prst="rect">
@@ -8780,8 +8780,8 @@
         </p:nvSpPr>
         <p:spPr>
           <a:xfrm>
-            <a:off x="6392770" y="4216300"/>
-            <a:ext cx="4875661" cy="289123"/>
+            <a:off x="8323793" y="5087300"/>
+            <a:ext cx="3041319" cy="289123"/>
           </a:xfrm>
           <a:prstGeom prst="rect">
             <a:avLst/>
@@ -8832,8 +8832,8 @@
         </p:nvSpPr>
         <p:spPr>
           <a:xfrm>
-            <a:off x="6384457" y="4209872"/>
-            <a:ext cx="4568090" cy="261610"/>
+            <a:off x="8315480" y="5080872"/>
+            <a:ext cx="2948079" cy="261610"/>
           </a:xfrm>
           <a:prstGeom prst="rect">
             <a:avLst/>
@@ -8876,7 +8876,7 @@
         </p:nvSpPr>
         <p:spPr>
           <a:xfrm>
-            <a:off x="691377" y="1775331"/>
+            <a:off x="691377" y="1153160"/>
             <a:ext cx="10809246" cy="3435378"/>
           </a:xfrm>
           <a:prstGeom prst="rect">
@@ -8928,7 +8928,7 @@
         </p:nvSpPr>
         <p:spPr>
           <a:xfrm>
-            <a:off x="691377" y="1768745"/>
+            <a:off x="691377" y="1146574"/>
             <a:ext cx="5428872" cy="261610"/>
           </a:xfrm>
           <a:prstGeom prst="rect">
@@ -9705,6 +9705,118 @@
             <a:r>
               <a:rPr lang="de-CH" sz="1100" b="1" dirty="0" err="1"/>
               <a:t>left</a:t>
+            </a:r>
+            <a:endParaRPr lang="de-CH" b="1" dirty="0"/>
+          </a:p>
+        </p:txBody>
+      </p:sp>
+      <p:sp>
+        <p:nvSpPr>
+          <p:cNvPr id="40" name="Rechteck 39">
+            <a:extLst>
+              <a:ext uri="{FF2B5EF4-FFF2-40B4-BE49-F238E27FC236}">
+                <a16:creationId xmlns:a16="http://schemas.microsoft.com/office/drawing/2014/main" id="{A0A6EDCF-39F2-B8C0-2118-3AA97C64D653}"/>
+              </a:ext>
+            </a:extLst>
+          </p:cNvPr>
+          <p:cNvSpPr/>
+          <p:nvPr/>
+        </p:nvSpPr>
+        <p:spPr>
+          <a:xfrm>
+            <a:off x="656029" y="4669842"/>
+            <a:ext cx="10879939" cy="794917"/>
+          </a:xfrm>
+          <a:prstGeom prst="rect">
+            <a:avLst/>
+          </a:prstGeom>
+          <a:noFill/>
+          <a:ln w="19050">
+            <a:solidFill>
+              <a:schemeClr val="tx1"/>
+            </a:solidFill>
+          </a:ln>
+        </p:spPr>
+        <p:style>
+          <a:lnRef idx="2">
+            <a:schemeClr val="accent1">
+              <a:shade val="50000"/>
+            </a:schemeClr>
+          </a:lnRef>
+          <a:fillRef idx="1">
+            <a:schemeClr val="accent1"/>
+          </a:fillRef>
+          <a:effectRef idx="0">
+            <a:schemeClr val="accent1"/>
+          </a:effectRef>
+          <a:fontRef idx="minor">
+            <a:schemeClr val="lt1"/>
+          </a:fontRef>
+        </p:style>
+        <p:txBody>
+          <a:bodyPr rtlCol="0" anchor="ctr"/>
+          <a:lstStyle/>
+          <a:p>
+            <a:pPr algn="ctr"/>
+            <a:endParaRPr lang="de-CH" dirty="0"/>
+          </a:p>
+        </p:txBody>
+      </p:sp>
+      <p:sp>
+        <p:nvSpPr>
+          <p:cNvPr id="41" name="Textfeld 40">
+            <a:extLst>
+              <a:ext uri="{FF2B5EF4-FFF2-40B4-BE49-F238E27FC236}">
+                <a16:creationId xmlns:a16="http://schemas.microsoft.com/office/drawing/2014/main" id="{F623C9BC-F81E-5917-E007-C482CA40797B}"/>
+              </a:ext>
+            </a:extLst>
+          </p:cNvPr>
+          <p:cNvSpPr txBox="1"/>
+          <p:nvPr/>
+        </p:nvSpPr>
+        <p:spPr>
+          <a:xfrm>
+            <a:off x="691376" y="4710827"/>
+            <a:ext cx="4333461" cy="261610"/>
+          </a:xfrm>
+          <a:prstGeom prst="rect">
+            <a:avLst/>
+          </a:prstGeom>
+          <a:noFill/>
+        </p:spPr>
+        <p:txBody>
+          <a:bodyPr wrap="square" rtlCol="0">
+            <a:spAutoFit/>
+          </a:bodyPr>
+          <a:lstStyle/>
+          <a:p>
+            <a:r>
+              <a:rPr lang="de-CH" sz="1100" b="1" dirty="0" err="1"/>
+              <a:t>id_div_admin_band_date</a:t>
+            </a:r>
+            <a:r>
+              <a:rPr lang="de-CH" sz="1100" b="1" dirty="0"/>
+              <a:t>  </a:t>
+            </a:r>
+            <a:r>
+              <a:rPr lang="de-CH" sz="1100" b="1" dirty="0" err="1"/>
+              <a:t>cl_div_admin_band_date</a:t>
+            </a:r>
+            <a:r>
+              <a:rPr lang="de-CH" sz="1100" b="1" dirty="0"/>
+              <a:t>  </a:t>
+            </a:r>
+            <a:r>
+              <a:rPr lang="de-CH" sz="1100" b="1" dirty="0" err="1"/>
+              <a:t>clear</a:t>
+            </a:r>
+            <a:r>
+              <a:rPr lang="de-CH" sz="1100" b="1" dirty="0"/>
+              <a:t> </a:t>
+            </a:r>
+            <a:r>
+              <a:rPr lang="de-CH" sz="1100" b="1" dirty="0" err="1"/>
+              <a:t>both</a:t>
             </a:r>
             <a:endParaRPr lang="de-CH" b="1" dirty="0"/>
           </a:p>

</xml_diff>